<commit_message>
Added in BUID and Video Link
Also Updated PPT
</commit_message>
<xml_diff>
--- a/Whack-A-Mole Presentation.pptx
+++ b/Whack-A-Mole Presentation.pptx
@@ -10458,7 +10458,7 @@
             </a:pPr>
             <a:r>
               <a:rPr lang="en"/>
-              <a:t>Status Update: 12/7/2020</a:t>
+              <a:t>Project Wrap Up 12/7/2020</a:t>
             </a:r>
             <a:endParaRPr/>
           </a:p>
@@ -10499,7 +10499,7 @@
             </a:pPr>
             <a:r>
               <a:rPr lang="en"/>
-              <a:t>We were able to resolve all of the failures from the 12th. The VGA’s ability to interface with the FPGA to display the squares was verified</a:t>
+              <a:t>We were able to resolve or improve on of the failures from the 2nd. The VGA’s ability to interface with the FPGA to display the squares was verified</a:t>
             </a:r>
             <a:endParaRPr/>
           </a:p>
@@ -10533,38 +10533,7 @@
             </a:pPr>
             <a:r>
               <a:rPr lang="en"/>
-              <a:t>The issue with switch inputs not catching the mole has been fixed. </a:t>
-            </a:r>
-            <a:endParaRPr/>
-          </a:p>
-          <a:p>
-            <a:pPr indent="0" lvl="0" marL="0" rtl="0" algn="l">
-              <a:spcBef>
-                <a:spcPts val="1600"/>
-              </a:spcBef>
-              <a:spcAft>
-                <a:spcPts val="0"/>
-              </a:spcAft>
-              <a:buNone/>
-            </a:pPr>
-            <a:r>
-              <a:t/>
-            </a:r>
-            <a:endParaRPr/>
-          </a:p>
-          <a:p>
-            <a:pPr indent="0" lvl="0" marL="0" rtl="0" algn="l">
-              <a:spcBef>
-                <a:spcPts val="1600"/>
-              </a:spcBef>
-              <a:spcAft>
-                <a:spcPts val="1600"/>
-              </a:spcAft>
-              <a:buNone/>
-            </a:pPr>
-            <a:r>
-              <a:rPr lang="en"/>
-              <a:t>Overall, all of the failures in our code have been resolved, and more features of the game such as multiple moles have been added in.</a:t>
+              <a:t>The issue with switch inputs not catching the mole has been improved. While the switch will still occasionally to catch the mole, it occurs much less frequently now.</a:t>
             </a:r>
             <a:endParaRPr/>
           </a:p>

</xml_diff>